<commit_message>
Documantation #28: Update week10.pptx
adding few more photos to the file.
</commit_message>
<xml_diff>
--- a/Documentation/Week10.pptx
+++ b/Documentation/Week10.pptx
@@ -14554,7 +14554,7 @@
       </p:grpSp>
       <p:pic>
         <p:nvPicPr>
-          <p:cNvPr id="34" name="Picture 33" descr="Milestones.png"/>
+          <p:cNvPr id="35" name="Picture 34" descr="Milestones.png"/>
           <p:cNvPicPr>
             <a:picLocks noChangeAspect="1"/>
           </p:cNvPicPr>
@@ -14568,8 +14568,8 @@
         </p:blipFill>
         <p:spPr>
           <a:xfrm>
-            <a:off x="744560" y="738232"/>
-            <a:ext cx="8038714" cy="5249654"/>
+            <a:off x="746620" y="1259243"/>
+            <a:ext cx="8107487" cy="4302657"/>
           </a:xfrm>
           <a:prstGeom prst="rect">
             <a:avLst/>

</xml_diff>